<commit_message>
finally! helen's last changes
</commit_message>
<xml_diff>
--- a/Slides/Module 3.pptx
+++ b/Slides/Module 3.pptx
@@ -4768,8 +4768,8 @@
           <a:lstStyle/>
           <a:p>
             <a:r>
-              <a:rPr lang="en-US" dirty="0" smtClean="0"/>
-              <a:t>Element interactions &amp; inline-block</a:t>
+              <a:rPr lang="en-US" smtClean="0"/>
+              <a:t>Element interactions</a:t>
             </a:r>
             <a:endParaRPr lang="en-US" dirty="0"/>
           </a:p>
@@ -4877,7 +4877,6 @@
               <a:rPr lang="en-GB" dirty="0" smtClean="0"/>
               <a:t>The Box Model</a:t>
             </a:r>
-            <a:endParaRPr lang="en-GB" dirty="0" smtClean="0"/>
           </a:p>
           <a:p>
             <a:r>
@@ -5128,19 +5127,18 @@
             </a:r>
             <a:r>
               <a:rPr lang="en-US" dirty="0" smtClean="0"/>
-              <a:t> – hides an element on the </a:t>
-            </a:r>
-            <a:r>
-              <a:rPr lang="en-US" dirty="0" smtClean="0"/>
-              <a:t>page</a:t>
-            </a:r>
-          </a:p>
-          <a:p>
-            <a:r>
-              <a:rPr lang="en-US" dirty="0" smtClean="0"/>
-              <a:t>Inline-Block - allows block elements to be on the same row</a:t>
-            </a:r>
-            <a:endParaRPr lang="en-US" dirty="0" smtClean="0"/>
+              <a:t> – hides an element on the page</a:t>
+            </a:r>
+          </a:p>
+          <a:p>
+            <a:r>
+              <a:rPr lang="en-US" b="1" dirty="0" smtClean="0"/>
+              <a:t>Inline-Block</a:t>
+            </a:r>
+            <a:r>
+              <a:rPr lang="en-US" dirty="0" smtClean="0"/>
+              <a:t> - allows block elements to be on the same row</a:t>
+            </a:r>
           </a:p>
           <a:p>
             <a:endParaRPr lang="en-US" dirty="0" smtClean="0"/>
@@ -5284,11 +5282,7 @@
             </a:r>
             <a:r>
               <a:rPr lang="en-US" dirty="0" smtClean="0"/>
-              <a:t> </a:t>
-            </a:r>
-            <a:r>
-              <a:rPr lang="en-US" dirty="0" smtClean="0"/>
-              <a:t>– exactly where you put it											</a:t>
+              <a:t> – exactly where you put it											</a:t>
             </a:r>
             <a:endParaRPr lang="en-US" dirty="0"/>
           </a:p>
@@ -5527,13 +5521,8 @@
           <a:p>
             <a:r>
               <a:rPr lang="en-US" dirty="0" smtClean="0"/>
-              <a:t>Padding – space within an element, but outside the </a:t>
-            </a:r>
-            <a:r>
-              <a:rPr lang="en-US" dirty="0" smtClean="0"/>
-              <a:t>content</a:t>
-            </a:r>
-            <a:endParaRPr lang="en-US" dirty="0" smtClean="0"/>
+              <a:t>Padding – space within an element, but outside the content</a:t>
+            </a:r>
           </a:p>
           <a:p>
             <a:endParaRPr lang="en-US" dirty="0" smtClean="0"/>
@@ -5869,15 +5858,7 @@
             </a:pPr>
             <a:r>
               <a:rPr lang="en-US" dirty="0" smtClean="0"/>
-              <a:t>By default, an element’s width and height </a:t>
-            </a:r>
-            <a:r>
-              <a:rPr lang="en-US" dirty="0" smtClean="0"/>
-              <a:t>sets the </a:t>
-            </a:r>
-            <a:r>
-              <a:rPr lang="en-US" dirty="0" smtClean="0"/>
-              <a:t>content box size</a:t>
+              <a:t>By default, an element’s width and height sets the content box size</a:t>
             </a:r>
           </a:p>
           <a:p>
@@ -5912,7 +5893,6 @@
               <a:rPr lang="en-US" dirty="0" smtClean="0"/>
               <a:t>instead</a:t>
             </a:r>
-            <a:endParaRPr lang="en-US" dirty="0" smtClean="0"/>
           </a:p>
           <a:p>
             <a:endParaRPr lang="en-US" dirty="0" smtClean="0"/>

</xml_diff>